<commit_message>
console with 20 rows
</commit_message>
<xml_diff>
--- a/art.pptx
+++ b/art.pptx
@@ -3728,6 +3728,105 @@
                 <a:t>&gt;</a:t>
               </a:r>
               <a:endParaRPr lang="en-US" sz="11500" dirty="0">
+                <a:solidFill>
+                  <a:srgbClr val="81C42D"/>
+                </a:solidFill>
+              </a:endParaRPr>
+            </a:p>
+          </p:txBody>
+        </p:sp>
+      </p:grpSp>
+      <p:grpSp>
+        <p:nvGrpSpPr>
+          <p:cNvPr id="18" name="Group 17"/>
+          <p:cNvGrpSpPr/>
+          <p:nvPr/>
+        </p:nvGrpSpPr>
+        <p:grpSpPr>
+          <a:xfrm>
+            <a:off x="6473408" y="3195884"/>
+            <a:ext cx="1828800" cy="3154710"/>
+            <a:chOff x="6473408" y="3195884"/>
+            <a:chExt cx="1828800" cy="3154710"/>
+          </a:xfrm>
+        </p:grpSpPr>
+        <p:sp>
+          <p:nvSpPr>
+            <p:cNvPr id="14" name="Rounded Rectangle 13"/>
+            <p:cNvSpPr/>
+            <p:nvPr/>
+          </p:nvSpPr>
+          <p:spPr>
+            <a:xfrm>
+              <a:off x="6473408" y="3882475"/>
+              <a:ext cx="1828800" cy="1828800"/>
+            </a:xfrm>
+            <a:prstGeom prst="roundRect">
+              <a:avLst/>
+            </a:prstGeom>
+            <a:solidFill>
+              <a:schemeClr val="tx1"/>
+            </a:solidFill>
+            <a:ln>
+              <a:noFill/>
+            </a:ln>
+          </p:spPr>
+          <p:style>
+            <a:lnRef idx="2">
+              <a:schemeClr val="accent1">
+                <a:shade val="50000"/>
+              </a:schemeClr>
+            </a:lnRef>
+            <a:fillRef idx="1">
+              <a:schemeClr val="accent1"/>
+            </a:fillRef>
+            <a:effectRef idx="0">
+              <a:schemeClr val="accent1"/>
+            </a:effectRef>
+            <a:fontRef idx="minor">
+              <a:schemeClr val="lt1"/>
+            </a:fontRef>
+          </p:style>
+          <p:txBody>
+            <a:bodyPr rtlCol="0" anchor="ctr"/>
+            <a:lstStyle/>
+            <a:p>
+              <a:pPr algn="ctr"/>
+              <a:endParaRPr lang="en-US"/>
+            </a:p>
+          </p:txBody>
+        </p:sp>
+        <p:sp>
+          <p:nvSpPr>
+            <p:cNvPr id="17" name="TextBox 16"/>
+            <p:cNvSpPr txBox="1"/>
+            <p:nvPr/>
+          </p:nvSpPr>
+          <p:spPr>
+            <a:xfrm>
+              <a:off x="6559868" y="3195884"/>
+              <a:ext cx="1455848" cy="3154710"/>
+            </a:xfrm>
+            <a:prstGeom prst="rect">
+              <a:avLst/>
+            </a:prstGeom>
+            <a:noFill/>
+          </p:spPr>
+          <p:txBody>
+            <a:bodyPr wrap="none" rtlCol="0">
+              <a:spAutoFit/>
+            </a:bodyPr>
+            <a:lstStyle/>
+            <a:p>
+              <a:r>
+                <a:rPr lang="en-US" sz="19900" dirty="0" smtClean="0">
+                  <a:solidFill>
+                    <a:srgbClr val="81C42D"/>
+                  </a:solidFill>
+                </a:rPr>
+                <a:t>&gt;</a:t>
+              </a:r>
+              <a:endParaRPr lang="en-US" sz="19900" dirty="0">
                 <a:solidFill>
                   <a:srgbClr val="81C42D"/>
                 </a:solidFill>

</xml_diff>